<commit_message>
Moving example images so they are not covered by the webcam
</commit_message>
<xml_diff>
--- a/unit_00/bootstrap/slides/05 Bootstrap Jumbotron.pptx
+++ b/unit_00/bootstrap/slides/05 Bootstrap Jumbotron.pptx
@@ -590,7 +590,7 @@
           <a:p>
             <a:fld id="{EA0C0817-A112-4847-8014-A94B7D2A4EA3}" type="datetime1">
               <a:rPr lang="en-US" smtClean="0"/>
-              <a:t>6/26/2020</a:t>
+              <a:t>9/1/2020</a:t>
             </a:fld>
             <a:endParaRPr lang="en-US" dirty="0"/>
           </a:p>
@@ -792,7 +792,7 @@
           <a:p>
             <a:fld id="{7332B432-ACDA-4023-A761-2BAB76577B62}" type="datetime1">
               <a:rPr lang="en-US" smtClean="0"/>
-              <a:t>6/26/2020</a:t>
+              <a:t>9/1/2020</a:t>
             </a:fld>
             <a:endParaRPr lang="en-US" dirty="0"/>
           </a:p>
@@ -1391,7 +1391,7 @@
           <a:p>
             <a:fld id="{D9C646AA-F36E-4540-911D-FFFC0A0EF24A}" type="datetime1">
               <a:rPr lang="en-US" smtClean="0"/>
-              <a:t>6/26/2020</a:t>
+              <a:t>9/1/2020</a:t>
             </a:fld>
             <a:endParaRPr lang="en-US" dirty="0"/>
           </a:p>
@@ -1711,7 +1711,7 @@
           <a:p>
             <a:fld id="{69186D26-FA5F-4637-B602-B7C2DC34CFD4}" type="datetime1">
               <a:rPr lang="en-US" smtClean="0"/>
-              <a:t>6/26/2020</a:t>
+              <a:t>9/1/2020</a:t>
             </a:fld>
             <a:endParaRPr lang="en-US" dirty="0"/>
           </a:p>
@@ -2148,7 +2148,7 @@
           <a:p>
             <a:fld id="{8A7F15D8-96D1-4781-BC50-CA8A088B2FE4}" type="datetime1">
               <a:rPr lang="en-US" smtClean="0"/>
-              <a:t>6/26/2020</a:t>
+              <a:t>9/1/2020</a:t>
             </a:fld>
             <a:endParaRPr lang="en-US" dirty="0"/>
           </a:p>
@@ -2266,7 +2266,7 @@
           <a:p>
             <a:fld id="{F9A96C99-B8F8-4528-BD05-0E16E943DC09}" type="datetime1">
               <a:rPr lang="en-US" smtClean="0"/>
-              <a:t>6/26/2020</a:t>
+              <a:t>9/1/2020</a:t>
             </a:fld>
             <a:endParaRPr lang="en-US" dirty="0"/>
           </a:p>
@@ -2361,7 +2361,7 @@
           <a:p>
             <a:fld id="{03636942-C211-4B28-8DBD-C953E00AF71B}" type="datetime1">
               <a:rPr lang="en-US" smtClean="0"/>
-              <a:t>6/26/2020</a:t>
+              <a:t>9/1/2020</a:t>
             </a:fld>
             <a:endParaRPr lang="en-US" dirty="0"/>
           </a:p>
@@ -2778,7 +2778,7 @@
           <a:p>
             <a:fld id="{7E8D12A6-918A-48BD-8CB9-CA713993B0EA}" type="datetime1">
               <a:rPr lang="en-US" smtClean="0"/>
-              <a:t>6/26/2020</a:t>
+              <a:t>9/1/2020</a:t>
             </a:fld>
             <a:endParaRPr lang="en-US" dirty="0"/>
           </a:p>
@@ -3040,7 +3040,7 @@
             <a:fld id="{E778CE86-875F-4587-BCF6-FA054AFC0D53}" type="datetime1">
               <a:rPr lang="en-US" smtClean="0"/>
               <a:pPr/>
-              <a:t>6/26/2020</a:t>
+              <a:t>9/1/2020</a:t>
             </a:fld>
             <a:endParaRPr lang="en-US" dirty="0"/>
           </a:p>
@@ -3556,7 +3556,7 @@
           <a:p>
             <a:fld id="{F6FA2B21-3FCD-4721-B95C-427943F61125}" type="datetime1">
               <a:rPr lang="en-US" smtClean="0"/>
-              <a:t>6/26/2020</a:t>
+              <a:t>9/1/2020</a:t>
             </a:fld>
             <a:endParaRPr lang="en-US" dirty="0"/>
           </a:p>
@@ -7025,7 +7025,7 @@
         </p:blipFill>
         <p:spPr>
           <a:xfrm>
-            <a:off x="6054570" y="4496718"/>
+            <a:off x="3630153" y="4706351"/>
             <a:ext cx="5343525" cy="2905125"/>
           </a:xfrm>
           <a:prstGeom prst="rect">
@@ -7323,6 +7323,24 @@
 </file>
 
 <file path=customXml/item1.xml><?xml version="1.0" encoding="utf-8"?>
+<p:properties xmlns:p="http://schemas.microsoft.com/office/2006/metadata/properties" xmlns:xsi="http://www.w3.org/2001/XMLSchema-instance" xmlns:pc="http://schemas.microsoft.com/office/infopath/2007/PartnerControls">
+  <documentManagement>
+    <Status xmlns="71af3243-3dd4-4a8d-8c0d-dd76da1f02a5">Not started</Status>
+    <MediaServiceKeyPoints xmlns="71af3243-3dd4-4a8d-8c0d-dd76da1f02a5" xsi:nil="true"/>
+  </documentManagement>
+</p:properties>
+</file>
+
+<file path=customXml/item2.xml><?xml version="1.0" encoding="utf-8"?>
+<?mso-contentType ?>
+<FormTemplates xmlns="http://schemas.microsoft.com/sharepoint/v3/contenttype/forms">
+  <Display>DocumentLibraryForm</Display>
+  <Edit>DocumentLibraryForm</Edit>
+  <New>DocumentLibraryForm</New>
+</FormTemplates>
+</file>
+
+<file path=customXml/item3.xml><?xml version="1.0" encoding="utf-8"?>
 <ct:contentTypeSchema xmlns:ct="http://schemas.microsoft.com/office/2006/metadata/contentType" xmlns:ma="http://schemas.microsoft.com/office/2006/metadata/properties/metaAttributes" ct:_="" ma:_="" ma:contentTypeName="Document" ma:contentTypeID="0x01010079F111ED35F8CC479449609E8A0923A6" ma:contentTypeVersion="12" ma:contentTypeDescription="Create a new document." ma:contentTypeScope="" ma:versionID="a410dd7f93c95333ffa1b60ed6adedd1">
   <xsd:schema xmlns:xsd="http://www.w3.org/2001/XMLSchema" xmlns:xs="http://www.w3.org/2001/XMLSchema" xmlns:p="http://schemas.microsoft.com/office/2006/metadata/properties" xmlns:ns2="71af3243-3dd4-4a8d-8c0d-dd76da1f02a5" xmlns:ns3="16c05727-aa75-4e4a-9b5f-8a80a1165891" targetNamespace="http://schemas.microsoft.com/office/2006/metadata/properties" ma:root="true" ma:fieldsID="a936d9baba76aa3866493feff160faab" ns2:_="" ns3:_="">
     <xsd:import namespace="71af3243-3dd4-4a8d-8c0d-dd76da1f02a5"/>
@@ -7543,25 +7561,25 @@
 </ct:contentTypeSchema>
 </file>
 
-<file path=customXml/item2.xml><?xml version="1.0" encoding="utf-8"?>
-<?mso-contentType ?>
-<FormTemplates xmlns="http://schemas.microsoft.com/sharepoint/v3/contenttype/forms">
-  <Display>DocumentLibraryForm</Display>
-  <Edit>DocumentLibraryForm</Edit>
-  <New>DocumentLibraryForm</New>
-</FormTemplates>
+<file path=customXml/itemProps1.xml><?xml version="1.0" encoding="utf-8"?>
+<ds:datastoreItem xmlns:ds="http://schemas.openxmlformats.org/officeDocument/2006/customXml" ds:itemID="{137651BA-F45C-4845-9AB3-E0A65B39F5E1}">
+  <ds:schemaRefs>
+    <ds:schemaRef ds:uri="http://schemas.microsoft.com/office/2006/metadata/properties"/>
+    <ds:schemaRef ds:uri="http://schemas.microsoft.com/office/infopath/2007/PartnerControls"/>
+    <ds:schemaRef ds:uri="71af3243-3dd4-4a8d-8c0d-dd76da1f02a5"/>
+  </ds:schemaRefs>
+</ds:datastoreItem>
 </file>
 
-<file path=customXml/item3.xml><?xml version="1.0" encoding="utf-8"?>
-<p:properties xmlns:p="http://schemas.microsoft.com/office/2006/metadata/properties" xmlns:xsi="http://www.w3.org/2001/XMLSchema-instance" xmlns:pc="http://schemas.microsoft.com/office/infopath/2007/PartnerControls">
-  <documentManagement>
-    <Status xmlns="71af3243-3dd4-4a8d-8c0d-dd76da1f02a5">Not started</Status>
-    <MediaServiceKeyPoints xmlns="71af3243-3dd4-4a8d-8c0d-dd76da1f02a5" xsi:nil="true"/>
-  </documentManagement>
-</p:properties>
+<file path=customXml/itemProps2.xml><?xml version="1.0" encoding="utf-8"?>
+<ds:datastoreItem xmlns:ds="http://schemas.openxmlformats.org/officeDocument/2006/customXml" ds:itemID="{CDB58277-F8DF-46FF-84EC-EF41B835E69F}">
+  <ds:schemaRefs>
+    <ds:schemaRef ds:uri="http://schemas.microsoft.com/sharepoint/v3/contenttype/forms"/>
+  </ds:schemaRefs>
+</ds:datastoreItem>
 </file>
 
-<file path=customXml/itemProps1.xml><?xml version="1.0" encoding="utf-8"?>
+<file path=customXml/itemProps3.xml><?xml version="1.0" encoding="utf-8"?>
 <ds:datastoreItem xmlns:ds="http://schemas.openxmlformats.org/officeDocument/2006/customXml" ds:itemID="{2D276E62-80A3-44DD-9BCC-97ED2B99B57F}">
   <ds:schemaRefs>
     <ds:schemaRef ds:uri="http://schemas.microsoft.com/office/2006/metadata/contentType"/>
@@ -7578,22 +7596,4 @@
     <ds:schemaRef ds:uri="http://schemas.microsoft.com/internal/obd"/>
   </ds:schemaRefs>
 </ds:datastoreItem>
-</file>
-
-<file path=customXml/itemProps2.xml><?xml version="1.0" encoding="utf-8"?>
-<ds:datastoreItem xmlns:ds="http://schemas.openxmlformats.org/officeDocument/2006/customXml" ds:itemID="{CDB58277-F8DF-46FF-84EC-EF41B835E69F}">
-  <ds:schemaRefs>
-    <ds:schemaRef ds:uri="http://schemas.microsoft.com/sharepoint/v3/contenttype/forms"/>
-  </ds:schemaRefs>
-</ds:datastoreItem>
-</file>
-
-<file path=customXml/itemProps3.xml><?xml version="1.0" encoding="utf-8"?>
-<ds:datastoreItem xmlns:ds="http://schemas.openxmlformats.org/officeDocument/2006/customXml" ds:itemID="{137651BA-F45C-4845-9AB3-E0A65B39F5E1}">
-  <ds:schemaRefs>
-    <ds:schemaRef ds:uri="http://schemas.microsoft.com/office/2006/metadata/properties"/>
-    <ds:schemaRef ds:uri="http://schemas.microsoft.com/office/infopath/2007/PartnerControls"/>
-    <ds:schemaRef ds:uri="71af3243-3dd4-4a8d-8c0d-dd76da1f02a5"/>
-  </ds:schemaRefs>
-</ds:datastoreItem>
 </file>
</xml_diff>